<commit_message>
Added slide on using derived classes and operator overloading for I/O
</commit_message>
<xml_diff>
--- a/CPlusPlus/04_essential_cpp_classes.pptx
+++ b/CPlusPlus/04_essential_cpp_classes.pptx
@@ -5,7 +5,7 @@
     <p:sldMasterId id="2147483660" r:id="rId1"/>
   </p:sldMasterIdLst>
   <p:notesMasterIdLst>
-    <p:notesMasterId r:id="rId10"/>
+    <p:notesMasterId r:id="rId12"/>
   </p:notesMasterIdLst>
   <p:sldIdLst>
     <p:sldId id="257" r:id="rId2"/>
@@ -16,6 +16,8 @@
     <p:sldId id="262" r:id="rId7"/>
     <p:sldId id="263" r:id="rId8"/>
     <p:sldId id="264" r:id="rId9"/>
+    <p:sldId id="265" r:id="rId10"/>
+    <p:sldId id="266" r:id="rId11"/>
   </p:sldIdLst>
   <p:sldSz cx="9144000" cy="6858000" type="screen4x3"/>
   <p:notesSz cx="6858000" cy="9144000"/>
@@ -204,7 +206,7 @@
           <a:p>
             <a:fld id="{79B8B1BA-E8A9-48CD-886E-2AED8C4BE354}" type="datetimeFigureOut">
               <a:rPr lang="en-US" smtClean="0"/>
-              <a:t>2017-02-28</a:t>
+              <a:t>2017-03-01</a:t>
             </a:fld>
             <a:endParaRPr lang="en-US"/>
           </a:p>
@@ -771,7 +773,7 @@
           <a:p>
             <a:fld id="{ABE0EDF4-4C0E-4772-84AE-1357C6001391}" type="datetime1">
               <a:rPr lang="en-US" smtClean="0"/>
-              <a:t>2017-02-28</a:t>
+              <a:t>2017-03-01</a:t>
             </a:fld>
             <a:endParaRPr lang="en-US"/>
           </a:p>
@@ -941,7 +943,7 @@
           <a:p>
             <a:fld id="{88C05809-344B-440B-9F88-C5B18C79382B}" type="datetime1">
               <a:rPr lang="en-US" smtClean="0"/>
-              <a:t>2017-02-28</a:t>
+              <a:t>2017-03-01</a:t>
             </a:fld>
             <a:endParaRPr lang="en-US"/>
           </a:p>
@@ -1121,7 +1123,7 @@
           <a:p>
             <a:fld id="{90F74260-95EE-4CD2-908E-53F4ED138E6A}" type="datetime1">
               <a:rPr lang="en-US" smtClean="0"/>
-              <a:t>2017-02-28</a:t>
+              <a:t>2017-03-01</a:t>
             </a:fld>
             <a:endParaRPr lang="en-US"/>
           </a:p>
@@ -1291,7 +1293,7 @@
           <a:p>
             <a:fld id="{1E3FA7D4-BD38-43A8-9130-CCA4F61A0EF1}" type="datetime1">
               <a:rPr lang="en-US" smtClean="0"/>
-              <a:t>2017-02-28</a:t>
+              <a:t>2017-03-01</a:t>
             </a:fld>
             <a:endParaRPr lang="en-US"/>
           </a:p>
@@ -1535,7 +1537,7 @@
           <a:p>
             <a:fld id="{096F3732-D81D-4EEE-A6C0-1A86B50EC6E7}" type="datetime1">
               <a:rPr lang="en-US" smtClean="0"/>
-              <a:t>2017-02-28</a:t>
+              <a:t>2017-03-01</a:t>
             </a:fld>
             <a:endParaRPr lang="en-US"/>
           </a:p>
@@ -1767,7 +1769,7 @@
           <a:p>
             <a:fld id="{08790459-F51D-4E85-A354-E358228D776E}" type="datetime1">
               <a:rPr lang="en-US" smtClean="0"/>
-              <a:t>2017-02-28</a:t>
+              <a:t>2017-03-01</a:t>
             </a:fld>
             <a:endParaRPr lang="en-US"/>
           </a:p>
@@ -2134,7 +2136,7 @@
           <a:p>
             <a:fld id="{B95FD88B-5497-4442-BF08-DF52AECDDAFE}" type="datetime1">
               <a:rPr lang="en-US" smtClean="0"/>
-              <a:t>2017-02-28</a:t>
+              <a:t>2017-03-01</a:t>
             </a:fld>
             <a:endParaRPr lang="en-US"/>
           </a:p>
@@ -2252,7 +2254,7 @@
           <a:p>
             <a:fld id="{CF2C86E3-CF93-475C-AE85-C652B2D2F9B5}" type="datetime1">
               <a:rPr lang="en-US" smtClean="0"/>
-              <a:t>2017-02-28</a:t>
+              <a:t>2017-03-01</a:t>
             </a:fld>
             <a:endParaRPr lang="en-US"/>
           </a:p>
@@ -2347,7 +2349,7 @@
           <a:p>
             <a:fld id="{F7F6E503-4705-4A51-BD29-968EA406E3C8}" type="datetime1">
               <a:rPr lang="en-US" smtClean="0"/>
-              <a:t>2017-02-28</a:t>
+              <a:t>2017-03-01</a:t>
             </a:fld>
             <a:endParaRPr lang="en-US"/>
           </a:p>
@@ -2624,7 +2626,7 @@
           <a:p>
             <a:fld id="{AF0FBBBB-E740-40DF-A365-D9B13EA44EB5}" type="datetime1">
               <a:rPr lang="en-US" smtClean="0"/>
-              <a:t>2017-02-28</a:t>
+              <a:t>2017-03-01</a:t>
             </a:fld>
             <a:endParaRPr lang="en-US"/>
           </a:p>
@@ -2881,7 +2883,7 @@
           <a:p>
             <a:fld id="{72BE145B-3D39-424D-9562-97A98B9610A2}" type="datetime1">
               <a:rPr lang="en-US" smtClean="0"/>
-              <a:t>2017-02-28</a:t>
+              <a:t>2017-03-01</a:t>
             </a:fld>
             <a:endParaRPr lang="en-US"/>
           </a:p>
@@ -3094,7 +3096,7 @@
           <a:p>
             <a:fld id="{623F5BA7-E58A-4B83-91F8-3B23CADD8CED}" type="datetime1">
               <a:rPr lang="en-US" smtClean="0"/>
-              <a:t>2017-02-28</a:t>
+              <a:t>2017-03-01</a:t>
             </a:fld>
             <a:endParaRPr lang="en-US"/>
           </a:p>
@@ -3662,6 +3664,1013 @@
 </p:sld>
 </file>
 
+<file path=ppt/slides/slide10.xml><?xml version="1.0" encoding="utf-8"?>
+<p:sld xmlns:a="http://schemas.openxmlformats.org/drawingml/2006/main" xmlns:r="http://schemas.openxmlformats.org/officeDocument/2006/relationships" xmlns:p="http://schemas.openxmlformats.org/presentationml/2006/main">
+  <p:cSld>
+    <p:spTree>
+      <p:nvGrpSpPr>
+        <p:cNvPr id="1" name=""/>
+        <p:cNvGrpSpPr/>
+        <p:nvPr/>
+      </p:nvGrpSpPr>
+      <p:grpSpPr>
+        <a:xfrm>
+          <a:off x="0" y="0"/>
+          <a:ext cx="0" cy="0"/>
+          <a:chOff x="0" y="0"/>
+          <a:chExt cx="0" cy="0"/>
+        </a:xfrm>
+      </p:grpSpPr>
+      <p:sp>
+        <p:nvSpPr>
+          <p:cNvPr id="2" name="Title 1"/>
+          <p:cNvSpPr>
+            <a:spLocks noGrp="1"/>
+          </p:cNvSpPr>
+          <p:nvPr>
+            <p:ph type="title"/>
+          </p:nvPr>
+        </p:nvSpPr>
+        <p:spPr/>
+        <p:txBody>
+          <a:bodyPr/>
+          <a:lstStyle/>
+          <a:p>
+            <a:r>
+              <a:rPr lang="en-US" dirty="0" smtClean="0"/>
+              <a:t>More overloading/overriding</a:t>
+            </a:r>
+            <a:endParaRPr lang="en-US" dirty="0"/>
+          </a:p>
+        </p:txBody>
+      </p:sp>
+      <p:sp>
+        <p:nvSpPr>
+          <p:cNvPr id="3" name="Slide Number Placeholder 2"/>
+          <p:cNvSpPr>
+            <a:spLocks noGrp="1"/>
+          </p:cNvSpPr>
+          <p:nvPr>
+            <p:ph type="sldNum" sz="quarter" idx="12"/>
+          </p:nvPr>
+        </p:nvSpPr>
+        <p:spPr/>
+        <p:txBody>
+          <a:bodyPr/>
+          <a:lstStyle/>
+          <a:p>
+            <a:fld id="{9CEF4966-5219-4577-B301-14467D565841}" type="slidenum">
+              <a:rPr lang="en-US" smtClean="0"/>
+              <a:t>10</a:t>
+            </a:fld>
+            <a:endParaRPr lang="en-US"/>
+          </a:p>
+        </p:txBody>
+      </p:sp>
+      <p:grpSp>
+        <p:nvGrpSpPr>
+          <p:cNvPr id="4" name="Group 3"/>
+          <p:cNvGrpSpPr/>
+          <p:nvPr/>
+        </p:nvGrpSpPr>
+        <p:grpSpPr>
+          <a:xfrm>
+            <a:off x="628650" y="1894725"/>
+            <a:ext cx="7592561" cy="2062103"/>
+            <a:chOff x="628649" y="1690689"/>
+            <a:chExt cx="7592561" cy="2062103"/>
+          </a:xfrm>
+        </p:grpSpPr>
+        <p:sp>
+          <p:nvSpPr>
+            <p:cNvPr id="5" name="TextBox 4"/>
+            <p:cNvSpPr txBox="1"/>
+            <p:nvPr/>
+          </p:nvSpPr>
+          <p:spPr>
+            <a:xfrm>
+              <a:off x="628649" y="1690689"/>
+              <a:ext cx="7592561" cy="2062103"/>
+            </a:xfrm>
+            <a:prstGeom prst="rect">
+              <a:avLst/>
+            </a:prstGeom>
+            <a:solidFill>
+              <a:schemeClr val="bg1">
+                <a:lumMod val="75000"/>
+              </a:schemeClr>
+            </a:solidFill>
+          </p:spPr>
+          <p:txBody>
+            <a:bodyPr wrap="square" rtlCol="0">
+              <a:spAutoFit/>
+            </a:bodyPr>
+            <a:lstStyle/>
+            <a:p>
+              <a:r>
+                <a:rPr lang="nn-NO" sz="1600" dirty="0">
+                  <a:latin typeface="Courier New" pitchFamily="49" charset="0"/>
+                  <a:cs typeface="Courier New" pitchFamily="49" charset="0"/>
+                </a:rPr>
+                <a:t>#include </a:t>
+              </a:r>
+              <a:r>
+                <a:rPr lang="nn-NO" sz="1600" dirty="0" smtClean="0">
+                  <a:latin typeface="Courier New" pitchFamily="49" charset="0"/>
+                  <a:cs typeface="Courier New" pitchFamily="49" charset="0"/>
+                </a:rPr>
+                <a:t>&lt;ostream</a:t>
+              </a:r>
+              <a:r>
+                <a:rPr lang="nn-NO" sz="1600" dirty="0">
+                  <a:latin typeface="Courier New" pitchFamily="49" charset="0"/>
+                  <a:cs typeface="Courier New" pitchFamily="49" charset="0"/>
+                </a:rPr>
+                <a:t>&gt;</a:t>
+              </a:r>
+            </a:p>
+            <a:p>
+              <a:r>
+                <a:rPr lang="nn-NO" sz="1600" dirty="0">
+                  <a:latin typeface="Courier New" pitchFamily="49" charset="0"/>
+                  <a:cs typeface="Courier New" pitchFamily="49" charset="0"/>
+                </a:rPr>
+                <a:t>#include </a:t>
+              </a:r>
+              <a:r>
+                <a:rPr lang="nn-NO" sz="1600" dirty="0" smtClean="0">
+                  <a:latin typeface="Courier New" pitchFamily="49" charset="0"/>
+                  <a:cs typeface="Courier New" pitchFamily="49" charset="0"/>
+                </a:rPr>
+                <a:t>"static_particle.h</a:t>
+              </a:r>
+              <a:r>
+                <a:rPr lang="nn-NO" sz="1600" dirty="0">
+                  <a:latin typeface="Courier New" pitchFamily="49" charset="0"/>
+                  <a:cs typeface="Courier New" pitchFamily="49" charset="0"/>
+                </a:rPr>
+                <a:t>"</a:t>
+              </a:r>
+            </a:p>
+            <a:p>
+              <a:r>
+                <a:rPr lang="nn-NO" sz="1600" dirty="0" smtClean="0">
+                  <a:latin typeface="Courier New" pitchFamily="49" charset="0"/>
+                  <a:cs typeface="Courier New" pitchFamily="49" charset="0"/>
+                </a:rPr>
+                <a:t>...</a:t>
+              </a:r>
+            </a:p>
+            <a:p>
+              <a:r>
+                <a:rPr lang="en-US" sz="1600" dirty="0" err="1" smtClean="0">
+                  <a:latin typeface="Courier New" pitchFamily="49" charset="0"/>
+                  <a:cs typeface="Courier New" pitchFamily="49" charset="0"/>
+                </a:rPr>
+                <a:t>std</a:t>
+              </a:r>
+              <a:r>
+                <a:rPr lang="en-US" sz="1600" dirty="0" smtClean="0">
+                  <a:latin typeface="Courier New" pitchFamily="49" charset="0"/>
+                  <a:cs typeface="Courier New" pitchFamily="49" charset="0"/>
+                </a:rPr>
+                <a:t>::</a:t>
+              </a:r>
+              <a:r>
+                <a:rPr lang="en-US" sz="1600" dirty="0" err="1" smtClean="0">
+                  <a:latin typeface="Courier New" pitchFamily="49" charset="0"/>
+                  <a:cs typeface="Courier New" pitchFamily="49" charset="0"/>
+                </a:rPr>
+                <a:t>ostream</a:t>
+              </a:r>
+              <a:r>
+                <a:rPr lang="en-US" sz="1600" dirty="0">
+                  <a:latin typeface="Courier New" pitchFamily="49" charset="0"/>
+                  <a:cs typeface="Courier New" pitchFamily="49" charset="0"/>
+                </a:rPr>
+                <a:t>&amp; </a:t>
+              </a:r>
+              <a:r>
+                <a:rPr lang="en-US" sz="1600" b="1" dirty="0">
+                  <a:solidFill>
+                    <a:srgbClr val="C00000"/>
+                  </a:solidFill>
+                  <a:latin typeface="Courier New" pitchFamily="49" charset="0"/>
+                  <a:cs typeface="Courier New" pitchFamily="49" charset="0"/>
+                </a:rPr>
+                <a:t>operator</a:t>
+              </a:r>
+              <a:r>
+                <a:rPr lang="en-US" sz="1600" b="1" dirty="0" smtClean="0">
+                  <a:solidFill>
+                    <a:srgbClr val="C00000"/>
+                  </a:solidFill>
+                  <a:latin typeface="Courier New" pitchFamily="49" charset="0"/>
+                  <a:cs typeface="Courier New" pitchFamily="49" charset="0"/>
+                </a:rPr>
+                <a:t>&lt;&lt;</a:t>
+              </a:r>
+              <a:r>
+                <a:rPr lang="en-US" sz="1600" dirty="0" smtClean="0">
+                  <a:latin typeface="Courier New" pitchFamily="49" charset="0"/>
+                  <a:cs typeface="Courier New" pitchFamily="49" charset="0"/>
+                </a:rPr>
+                <a:t>(</a:t>
+              </a:r>
+              <a:r>
+                <a:rPr lang="en-US" sz="1600" dirty="0" err="1" smtClean="0">
+                  <a:latin typeface="Courier New" pitchFamily="49" charset="0"/>
+                  <a:cs typeface="Courier New" pitchFamily="49" charset="0"/>
+                </a:rPr>
+                <a:t>std</a:t>
+              </a:r>
+              <a:r>
+                <a:rPr lang="en-US" sz="1600" dirty="0" smtClean="0">
+                  <a:latin typeface="Courier New" pitchFamily="49" charset="0"/>
+                  <a:cs typeface="Courier New" pitchFamily="49" charset="0"/>
+                </a:rPr>
+                <a:t>::</a:t>
+              </a:r>
+              <a:r>
+                <a:rPr lang="en-US" sz="1600" dirty="0" err="1" smtClean="0">
+                  <a:latin typeface="Courier New" pitchFamily="49" charset="0"/>
+                  <a:cs typeface="Courier New" pitchFamily="49" charset="0"/>
+                </a:rPr>
+                <a:t>ostream</a:t>
+              </a:r>
+              <a:r>
+                <a:rPr lang="en-US" sz="1600" dirty="0">
+                  <a:latin typeface="Courier New" pitchFamily="49" charset="0"/>
+                  <a:cs typeface="Courier New" pitchFamily="49" charset="0"/>
+                </a:rPr>
+                <a:t>&amp; </a:t>
+              </a:r>
+              <a:r>
+                <a:rPr lang="en-US" sz="1600" dirty="0" smtClean="0">
+                  <a:latin typeface="Courier New" pitchFamily="49" charset="0"/>
+                  <a:cs typeface="Courier New" pitchFamily="49" charset="0"/>
+                </a:rPr>
+                <a:t>out,</a:t>
+              </a:r>
+            </a:p>
+            <a:p>
+              <a:r>
+                <a:rPr lang="en-US" sz="1600" dirty="0">
+                  <a:latin typeface="Courier New" pitchFamily="49" charset="0"/>
+                  <a:cs typeface="Courier New" pitchFamily="49" charset="0"/>
+                </a:rPr>
+                <a:t> </a:t>
+              </a:r>
+              <a:r>
+                <a:rPr lang="en-US" sz="1600" dirty="0" smtClean="0">
+                  <a:latin typeface="Courier New" pitchFamily="49" charset="0"/>
+                  <a:cs typeface="Courier New" pitchFamily="49" charset="0"/>
+                </a:rPr>
+                <a:t>                        </a:t>
+              </a:r>
+              <a:r>
+                <a:rPr lang="en-US" sz="1600" dirty="0" err="1" smtClean="0">
+                  <a:latin typeface="Courier New" pitchFamily="49" charset="0"/>
+                  <a:cs typeface="Courier New" pitchFamily="49" charset="0"/>
+                </a:rPr>
+                <a:t>const</a:t>
+              </a:r>
+              <a:r>
+                <a:rPr lang="en-US" sz="1600" dirty="0" smtClean="0">
+                  <a:latin typeface="Courier New" pitchFamily="49" charset="0"/>
+                  <a:cs typeface="Courier New" pitchFamily="49" charset="0"/>
+                </a:rPr>
+                <a:t> </a:t>
+              </a:r>
+              <a:r>
+                <a:rPr lang="en-US" sz="1600" dirty="0" err="1">
+                  <a:latin typeface="Courier New" pitchFamily="49" charset="0"/>
+                  <a:cs typeface="Courier New" pitchFamily="49" charset="0"/>
+                </a:rPr>
+                <a:t>StaticParticle</a:t>
+              </a:r>
+              <a:r>
+                <a:rPr lang="en-US" sz="1600" dirty="0">
+                  <a:latin typeface="Courier New" pitchFamily="49" charset="0"/>
+                  <a:cs typeface="Courier New" pitchFamily="49" charset="0"/>
+                </a:rPr>
+                <a:t>&amp; p) {</a:t>
+              </a:r>
+            </a:p>
+            <a:p>
+              <a:r>
+                <a:rPr lang="en-US" sz="1600" dirty="0">
+                  <a:latin typeface="Courier New" pitchFamily="49" charset="0"/>
+                  <a:cs typeface="Courier New" pitchFamily="49" charset="0"/>
+                </a:rPr>
+                <a:t>    return out &lt;&lt; "(" &lt;&lt; </a:t>
+              </a:r>
+              <a:r>
+                <a:rPr lang="en-US" sz="1600" dirty="0" err="1">
+                  <a:latin typeface="Courier New" pitchFamily="49" charset="0"/>
+                  <a:cs typeface="Courier New" pitchFamily="49" charset="0"/>
+                </a:rPr>
+                <a:t>p.x</a:t>
+              </a:r>
+              <a:r>
+                <a:rPr lang="en-US" sz="1600" dirty="0">
+                  <a:latin typeface="Courier New" pitchFamily="49" charset="0"/>
+                  <a:cs typeface="Courier New" pitchFamily="49" charset="0"/>
+                </a:rPr>
+                <a:t>() &lt;&lt; ", " &lt;&lt; </a:t>
+              </a:r>
+              <a:r>
+                <a:rPr lang="en-US" sz="1600" dirty="0" err="1">
+                  <a:latin typeface="Courier New" pitchFamily="49" charset="0"/>
+                  <a:cs typeface="Courier New" pitchFamily="49" charset="0"/>
+                </a:rPr>
+                <a:t>p.y</a:t>
+              </a:r>
+              <a:r>
+                <a:rPr lang="en-US" sz="1600" dirty="0">
+                  <a:latin typeface="Courier New" pitchFamily="49" charset="0"/>
+                  <a:cs typeface="Courier New" pitchFamily="49" charset="0"/>
+                </a:rPr>
+                <a:t>() &lt;&lt; ")"</a:t>
+              </a:r>
+            </a:p>
+            <a:p>
+              <a:r>
+                <a:rPr lang="en-US" sz="1600" dirty="0">
+                  <a:latin typeface="Courier New" pitchFamily="49" charset="0"/>
+                  <a:cs typeface="Courier New" pitchFamily="49" charset="0"/>
+                </a:rPr>
+                <a:t>           &lt;&lt; ", mass = " &lt;&lt; </a:t>
+              </a:r>
+              <a:r>
+                <a:rPr lang="en-US" sz="1600" dirty="0" err="1">
+                  <a:latin typeface="Courier New" pitchFamily="49" charset="0"/>
+                  <a:cs typeface="Courier New" pitchFamily="49" charset="0"/>
+                </a:rPr>
+                <a:t>p.mass</a:t>
+              </a:r>
+              <a:r>
+                <a:rPr lang="en-US" sz="1600" dirty="0">
+                  <a:latin typeface="Courier New" pitchFamily="49" charset="0"/>
+                  <a:cs typeface="Courier New" pitchFamily="49" charset="0"/>
+                </a:rPr>
+                <a:t>();</a:t>
+              </a:r>
+            </a:p>
+            <a:p>
+              <a:r>
+                <a:rPr lang="en-US" sz="1600" dirty="0" smtClean="0">
+                  <a:latin typeface="Courier New" pitchFamily="49" charset="0"/>
+                  <a:cs typeface="Courier New" pitchFamily="49" charset="0"/>
+                </a:rPr>
+                <a:t>}</a:t>
+              </a:r>
+              <a:endParaRPr lang="en-US" sz="1600" dirty="0">
+                <a:latin typeface="Courier New" pitchFamily="49" charset="0"/>
+                <a:cs typeface="Courier New" pitchFamily="49" charset="0"/>
+              </a:endParaRPr>
+            </a:p>
+          </p:txBody>
+        </p:sp>
+        <p:sp>
+          <p:nvSpPr>
+            <p:cNvPr id="6" name="TextBox 5"/>
+            <p:cNvSpPr txBox="1"/>
+            <p:nvPr/>
+          </p:nvSpPr>
+          <p:spPr>
+            <a:xfrm>
+              <a:off x="6270035" y="1698053"/>
+              <a:ext cx="1951175" cy="276999"/>
+            </a:xfrm>
+            <a:prstGeom prst="rect">
+              <a:avLst/>
+            </a:prstGeom>
+            <a:solidFill>
+              <a:schemeClr val="bg1"/>
+            </a:solidFill>
+            <a:ln>
+              <a:solidFill>
+                <a:schemeClr val="tx1"/>
+              </a:solidFill>
+            </a:ln>
+          </p:spPr>
+          <p:txBody>
+            <a:bodyPr wrap="none" rtlCol="0">
+              <a:spAutoFit/>
+            </a:bodyPr>
+            <a:lstStyle/>
+            <a:p>
+              <a:r>
+                <a:rPr lang="en-US" sz="1200" dirty="0" smtClean="0">
+                  <a:latin typeface="Courier New" panose="02070309020205020404" pitchFamily="49" charset="0"/>
+                  <a:cs typeface="Courier New" panose="02070309020205020404" pitchFamily="49" charset="0"/>
+                </a:rPr>
+                <a:t>static_particle.cpp</a:t>
+              </a:r>
+              <a:endParaRPr lang="en-US" sz="1200" dirty="0">
+                <a:latin typeface="Courier New" panose="02070309020205020404" pitchFamily="49" charset="0"/>
+                <a:cs typeface="Courier New" panose="02070309020205020404" pitchFamily="49" charset="0"/>
+              </a:endParaRPr>
+            </a:p>
+          </p:txBody>
+        </p:sp>
+      </p:grpSp>
+      <p:grpSp>
+        <p:nvGrpSpPr>
+          <p:cNvPr id="7" name="Group 6"/>
+          <p:cNvGrpSpPr/>
+          <p:nvPr/>
+        </p:nvGrpSpPr>
+        <p:grpSpPr>
+          <a:xfrm>
+            <a:off x="628650" y="4125538"/>
+            <a:ext cx="7592561" cy="2062103"/>
+            <a:chOff x="628649" y="1690689"/>
+            <a:chExt cx="7592561" cy="2062103"/>
+          </a:xfrm>
+        </p:grpSpPr>
+        <p:sp>
+          <p:nvSpPr>
+            <p:cNvPr id="8" name="TextBox 7"/>
+            <p:cNvSpPr txBox="1"/>
+            <p:nvPr/>
+          </p:nvSpPr>
+          <p:spPr>
+            <a:xfrm>
+              <a:off x="628649" y="1690689"/>
+              <a:ext cx="7592561" cy="2062103"/>
+            </a:xfrm>
+            <a:prstGeom prst="rect">
+              <a:avLst/>
+            </a:prstGeom>
+            <a:solidFill>
+              <a:schemeClr val="bg1">
+                <a:lumMod val="75000"/>
+              </a:schemeClr>
+            </a:solidFill>
+          </p:spPr>
+          <p:txBody>
+            <a:bodyPr wrap="square" rtlCol="0">
+              <a:spAutoFit/>
+            </a:bodyPr>
+            <a:lstStyle/>
+            <a:p>
+              <a:r>
+                <a:rPr lang="nn-NO" sz="1600" dirty="0">
+                  <a:latin typeface="Courier New" pitchFamily="49" charset="0"/>
+                  <a:cs typeface="Courier New" pitchFamily="49" charset="0"/>
+                </a:rPr>
+                <a:t>#include </a:t>
+              </a:r>
+              <a:r>
+                <a:rPr lang="nn-NO" sz="1600" dirty="0" smtClean="0">
+                  <a:latin typeface="Courier New" pitchFamily="49" charset="0"/>
+                  <a:cs typeface="Courier New" pitchFamily="49" charset="0"/>
+                </a:rPr>
+                <a:t>&lt;ostream</a:t>
+              </a:r>
+              <a:r>
+                <a:rPr lang="nn-NO" sz="1600" dirty="0">
+                  <a:latin typeface="Courier New" pitchFamily="49" charset="0"/>
+                  <a:cs typeface="Courier New" pitchFamily="49" charset="0"/>
+                </a:rPr>
+                <a:t>&gt;</a:t>
+              </a:r>
+            </a:p>
+            <a:p>
+              <a:r>
+                <a:rPr lang="nn-NO" sz="1600" dirty="0">
+                  <a:latin typeface="Courier New" pitchFamily="49" charset="0"/>
+                  <a:cs typeface="Courier New" pitchFamily="49" charset="0"/>
+                </a:rPr>
+                <a:t>#include </a:t>
+              </a:r>
+              <a:r>
+                <a:rPr lang="nn-NO" sz="1600" dirty="0" smtClean="0">
+                  <a:latin typeface="Courier New" pitchFamily="49" charset="0"/>
+                  <a:cs typeface="Courier New" pitchFamily="49" charset="0"/>
+                </a:rPr>
+                <a:t>"particle.h</a:t>
+              </a:r>
+              <a:r>
+                <a:rPr lang="nn-NO" sz="1600" dirty="0">
+                  <a:latin typeface="Courier New" pitchFamily="49" charset="0"/>
+                  <a:cs typeface="Courier New" pitchFamily="49" charset="0"/>
+                </a:rPr>
+                <a:t>"</a:t>
+              </a:r>
+            </a:p>
+            <a:p>
+              <a:r>
+                <a:rPr lang="nn-NO" sz="1600" dirty="0" smtClean="0">
+                  <a:latin typeface="Courier New" pitchFamily="49" charset="0"/>
+                  <a:cs typeface="Courier New" pitchFamily="49" charset="0"/>
+                </a:rPr>
+                <a:t>...</a:t>
+              </a:r>
+            </a:p>
+            <a:p>
+              <a:r>
+                <a:rPr lang="en-US" sz="1600" dirty="0" err="1">
+                  <a:latin typeface="Courier New" pitchFamily="49" charset="0"/>
+                  <a:cs typeface="Courier New" pitchFamily="49" charset="0"/>
+                </a:rPr>
+                <a:t>std</a:t>
+              </a:r>
+              <a:r>
+                <a:rPr lang="en-US" sz="1600" dirty="0">
+                  <a:latin typeface="Courier New" pitchFamily="49" charset="0"/>
+                  <a:cs typeface="Courier New" pitchFamily="49" charset="0"/>
+                </a:rPr>
+                <a:t>::</a:t>
+              </a:r>
+              <a:r>
+                <a:rPr lang="en-US" sz="1600" dirty="0" err="1">
+                  <a:latin typeface="Courier New" pitchFamily="49" charset="0"/>
+                  <a:cs typeface="Courier New" pitchFamily="49" charset="0"/>
+                </a:rPr>
+                <a:t>ostream</a:t>
+              </a:r>
+              <a:r>
+                <a:rPr lang="en-US" sz="1600" dirty="0">
+                  <a:latin typeface="Courier New" pitchFamily="49" charset="0"/>
+                  <a:cs typeface="Courier New" pitchFamily="49" charset="0"/>
+                </a:rPr>
+                <a:t>&amp; </a:t>
+              </a:r>
+              <a:r>
+                <a:rPr lang="en-US" sz="1600" b="1" dirty="0" smtClean="0">
+                  <a:solidFill>
+                    <a:srgbClr val="C00000"/>
+                  </a:solidFill>
+                  <a:latin typeface="Courier New" pitchFamily="49" charset="0"/>
+                  <a:cs typeface="Courier New" pitchFamily="49" charset="0"/>
+                </a:rPr>
+                <a:t>operator&lt;&lt;</a:t>
+              </a:r>
+              <a:r>
+                <a:rPr lang="en-US" sz="1600" dirty="0" smtClean="0">
+                  <a:latin typeface="Courier New" pitchFamily="49" charset="0"/>
+                  <a:cs typeface="Courier New" pitchFamily="49" charset="0"/>
+                </a:rPr>
+                <a:t>(</a:t>
+              </a:r>
+              <a:r>
+                <a:rPr lang="en-US" sz="1600" dirty="0" err="1" smtClean="0">
+                  <a:latin typeface="Courier New" pitchFamily="49" charset="0"/>
+                  <a:cs typeface="Courier New" pitchFamily="49" charset="0"/>
+                </a:rPr>
+                <a:t>std</a:t>
+              </a:r>
+              <a:r>
+                <a:rPr lang="en-US" sz="1600" dirty="0">
+                  <a:latin typeface="Courier New" pitchFamily="49" charset="0"/>
+                  <a:cs typeface="Courier New" pitchFamily="49" charset="0"/>
+                </a:rPr>
+                <a:t>::</a:t>
+              </a:r>
+              <a:r>
+                <a:rPr lang="en-US" sz="1600" dirty="0" err="1">
+                  <a:latin typeface="Courier New" pitchFamily="49" charset="0"/>
+                  <a:cs typeface="Courier New" pitchFamily="49" charset="0"/>
+                </a:rPr>
+                <a:t>ostream</a:t>
+              </a:r>
+              <a:r>
+                <a:rPr lang="en-US" sz="1600" dirty="0">
+                  <a:latin typeface="Courier New" pitchFamily="49" charset="0"/>
+                  <a:cs typeface="Courier New" pitchFamily="49" charset="0"/>
+                </a:rPr>
+                <a:t>&amp; </a:t>
+              </a:r>
+              <a:r>
+                <a:rPr lang="en-US" sz="1600" dirty="0" smtClean="0">
+                  <a:latin typeface="Courier New" pitchFamily="49" charset="0"/>
+                  <a:cs typeface="Courier New" pitchFamily="49" charset="0"/>
+                </a:rPr>
+                <a:t>out,</a:t>
+              </a:r>
+              <a:br>
+                <a:rPr lang="en-US" sz="1600" dirty="0" smtClean="0">
+                  <a:latin typeface="Courier New" pitchFamily="49" charset="0"/>
+                  <a:cs typeface="Courier New" pitchFamily="49" charset="0"/>
+                </a:rPr>
+              </a:br>
+              <a:r>
+                <a:rPr lang="en-US" sz="1600" dirty="0" smtClean="0">
+                  <a:latin typeface="Courier New" pitchFamily="49" charset="0"/>
+                  <a:cs typeface="Courier New" pitchFamily="49" charset="0"/>
+                </a:rPr>
+                <a:t>                         </a:t>
+              </a:r>
+              <a:r>
+                <a:rPr lang="en-US" sz="1600" dirty="0" err="1" smtClean="0">
+                  <a:latin typeface="Courier New" pitchFamily="49" charset="0"/>
+                  <a:cs typeface="Courier New" pitchFamily="49" charset="0"/>
+                </a:rPr>
+                <a:t>const</a:t>
+              </a:r>
+              <a:r>
+                <a:rPr lang="en-US" sz="1600" dirty="0" smtClean="0">
+                  <a:latin typeface="Courier New" pitchFamily="49" charset="0"/>
+                  <a:cs typeface="Courier New" pitchFamily="49" charset="0"/>
+                </a:rPr>
+                <a:t> </a:t>
+              </a:r>
+              <a:r>
+                <a:rPr lang="en-US" sz="1600" dirty="0">
+                  <a:latin typeface="Courier New" pitchFamily="49" charset="0"/>
+                  <a:cs typeface="Courier New" pitchFamily="49" charset="0"/>
+                </a:rPr>
+                <a:t>Particle&amp; p) {</a:t>
+              </a:r>
+            </a:p>
+            <a:p>
+              <a:r>
+                <a:rPr lang="en-US" sz="1600" dirty="0">
+                  <a:latin typeface="Courier New" pitchFamily="49" charset="0"/>
+                  <a:cs typeface="Courier New" pitchFamily="49" charset="0"/>
+                </a:rPr>
+                <a:t>    return out &lt;&lt; </a:t>
+              </a:r>
+              <a:r>
+                <a:rPr lang="en-US" sz="1600" b="1" dirty="0">
+                  <a:solidFill>
+                    <a:srgbClr val="C00000"/>
+                  </a:solidFill>
+                  <a:latin typeface="Courier New" pitchFamily="49" charset="0"/>
+                  <a:cs typeface="Courier New" pitchFamily="49" charset="0"/>
+                </a:rPr>
+                <a:t>(</a:t>
+              </a:r>
+              <a:r>
+                <a:rPr lang="en-US" sz="1600" b="1" dirty="0" err="1">
+                  <a:solidFill>
+                    <a:srgbClr val="C00000"/>
+                  </a:solidFill>
+                  <a:latin typeface="Courier New" pitchFamily="49" charset="0"/>
+                  <a:cs typeface="Courier New" pitchFamily="49" charset="0"/>
+                </a:rPr>
+                <a:t>StaticParticle</a:t>
+              </a:r>
+              <a:r>
+                <a:rPr lang="en-US" sz="1600" b="1" dirty="0">
+                  <a:solidFill>
+                    <a:srgbClr val="C00000"/>
+                  </a:solidFill>
+                  <a:latin typeface="Courier New" pitchFamily="49" charset="0"/>
+                  <a:cs typeface="Courier New" pitchFamily="49" charset="0"/>
+                </a:rPr>
+                <a:t>)</a:t>
+              </a:r>
+              <a:r>
+                <a:rPr lang="en-US" sz="1600" dirty="0">
+                  <a:latin typeface="Courier New" pitchFamily="49" charset="0"/>
+                  <a:cs typeface="Courier New" pitchFamily="49" charset="0"/>
+                </a:rPr>
+                <a:t> p &lt;&lt; ", ("</a:t>
+              </a:r>
+            </a:p>
+            <a:p>
+              <a:r>
+                <a:rPr lang="en-US" sz="1600" dirty="0">
+                  <a:latin typeface="Courier New" pitchFamily="49" charset="0"/>
+                  <a:cs typeface="Courier New" pitchFamily="49" charset="0"/>
+                </a:rPr>
+                <a:t>               &lt;&lt; </a:t>
+              </a:r>
+              <a:r>
+                <a:rPr lang="en-US" sz="1600" dirty="0" err="1">
+                  <a:latin typeface="Courier New" pitchFamily="49" charset="0"/>
+                  <a:cs typeface="Courier New" pitchFamily="49" charset="0"/>
+                </a:rPr>
+                <a:t>p.v_x</a:t>
+              </a:r>
+              <a:r>
+                <a:rPr lang="en-US" sz="1600" dirty="0">
+                  <a:latin typeface="Courier New" pitchFamily="49" charset="0"/>
+                  <a:cs typeface="Courier New" pitchFamily="49" charset="0"/>
+                </a:rPr>
+                <a:t>() &lt;&lt; ", " &lt;&lt; </a:t>
+              </a:r>
+              <a:r>
+                <a:rPr lang="en-US" sz="1600" dirty="0" err="1">
+                  <a:latin typeface="Courier New" pitchFamily="49" charset="0"/>
+                  <a:cs typeface="Courier New" pitchFamily="49" charset="0"/>
+                </a:rPr>
+                <a:t>p.v_y</a:t>
+              </a:r>
+              <a:r>
+                <a:rPr lang="en-US" sz="1600" dirty="0">
+                  <a:latin typeface="Courier New" pitchFamily="49" charset="0"/>
+                  <a:cs typeface="Courier New" pitchFamily="49" charset="0"/>
+                </a:rPr>
+                <a:t>() &lt;&lt; ")";</a:t>
+              </a:r>
+            </a:p>
+            <a:p>
+              <a:r>
+                <a:rPr lang="en-US" sz="1600" dirty="0">
+                  <a:latin typeface="Courier New" pitchFamily="49" charset="0"/>
+                  <a:cs typeface="Courier New" pitchFamily="49" charset="0"/>
+                </a:rPr>
+                <a:t>}</a:t>
+              </a:r>
+            </a:p>
+          </p:txBody>
+        </p:sp>
+        <p:sp>
+          <p:nvSpPr>
+            <p:cNvPr id="9" name="TextBox 8"/>
+            <p:cNvSpPr txBox="1"/>
+            <p:nvPr/>
+          </p:nvSpPr>
+          <p:spPr>
+            <a:xfrm>
+              <a:off x="6920854" y="1690689"/>
+              <a:ext cx="1300356" cy="276999"/>
+            </a:xfrm>
+            <a:prstGeom prst="rect">
+              <a:avLst/>
+            </a:prstGeom>
+            <a:solidFill>
+              <a:schemeClr val="bg1"/>
+            </a:solidFill>
+            <a:ln>
+              <a:solidFill>
+                <a:schemeClr val="tx1"/>
+              </a:solidFill>
+            </a:ln>
+          </p:spPr>
+          <p:txBody>
+            <a:bodyPr wrap="none" rtlCol="0">
+              <a:spAutoFit/>
+            </a:bodyPr>
+            <a:lstStyle/>
+            <a:p>
+              <a:r>
+                <a:rPr lang="en-US" sz="1200" dirty="0" smtClean="0">
+                  <a:latin typeface="Courier New" panose="02070309020205020404" pitchFamily="49" charset="0"/>
+                  <a:cs typeface="Courier New" panose="02070309020205020404" pitchFamily="49" charset="0"/>
+                </a:rPr>
+                <a:t>particle.cpp</a:t>
+              </a:r>
+              <a:endParaRPr lang="en-US" sz="1200" dirty="0">
+                <a:latin typeface="Courier New" panose="02070309020205020404" pitchFamily="49" charset="0"/>
+                <a:cs typeface="Courier New" panose="02070309020205020404" pitchFamily="49" charset="0"/>
+              </a:endParaRPr>
+            </a:p>
+          </p:txBody>
+        </p:sp>
+      </p:grpSp>
+      <p:grpSp>
+        <p:nvGrpSpPr>
+          <p:cNvPr id="10" name="Group 9"/>
+          <p:cNvGrpSpPr/>
+          <p:nvPr/>
+        </p:nvGrpSpPr>
+        <p:grpSpPr>
+          <a:xfrm>
+            <a:off x="4815281" y="5654180"/>
+            <a:ext cx="3045403" cy="1067296"/>
+            <a:chOff x="1159177" y="4469693"/>
+            <a:chExt cx="3045403" cy="1067296"/>
+          </a:xfrm>
+        </p:grpSpPr>
+        <p:sp>
+          <p:nvSpPr>
+            <p:cNvPr id="11" name="TextBox 10"/>
+            <p:cNvSpPr txBox="1"/>
+            <p:nvPr/>
+          </p:nvSpPr>
+          <p:spPr>
+            <a:xfrm>
+              <a:off x="1399111" y="4829103"/>
+              <a:ext cx="2805469" cy="707886"/>
+            </a:xfrm>
+            <a:prstGeom prst="rect">
+              <a:avLst/>
+            </a:prstGeom>
+            <a:solidFill>
+              <a:schemeClr val="bg1"/>
+            </a:solidFill>
+            <a:ln w="19050">
+              <a:solidFill>
+                <a:schemeClr val="tx1"/>
+              </a:solidFill>
+            </a:ln>
+          </p:spPr>
+          <p:txBody>
+            <a:bodyPr wrap="square" rtlCol="0">
+              <a:spAutoFit/>
+            </a:bodyPr>
+            <a:lstStyle/>
+            <a:p>
+              <a:r>
+                <a:rPr lang="en-US" sz="2000" dirty="0" smtClean="0"/>
+                <a:t>type cast, </a:t>
+              </a:r>
+              <a:r>
+                <a:rPr lang="en-US" sz="2000" dirty="0" smtClean="0">
+                  <a:latin typeface="Courier New" panose="02070309020205020404" pitchFamily="49" charset="0"/>
+                  <a:cs typeface="Courier New" panose="02070309020205020404" pitchFamily="49" charset="0"/>
+                </a:rPr>
+                <a:t>p</a:t>
+              </a:r>
+              <a:r>
+                <a:rPr lang="en-US" sz="2000" dirty="0" smtClean="0"/>
+                <a:t> is also</a:t>
+              </a:r>
+              <a:br>
+                <a:rPr lang="en-US" sz="2000" dirty="0" smtClean="0"/>
+              </a:br>
+              <a:r>
+                <a:rPr lang="en-US" sz="2000" dirty="0" err="1" smtClean="0">
+                  <a:latin typeface="Courier New" panose="02070309020205020404" pitchFamily="49" charset="0"/>
+                  <a:cs typeface="Courier New" panose="02070309020205020404" pitchFamily="49" charset="0"/>
+                </a:rPr>
+                <a:t>StaticParticle</a:t>
+              </a:r>
+              <a:endParaRPr lang="en-US" sz="2000" dirty="0">
+                <a:latin typeface="Courier New" panose="02070309020205020404" pitchFamily="49" charset="0"/>
+                <a:cs typeface="Courier New" panose="02070309020205020404" pitchFamily="49" charset="0"/>
+              </a:endParaRPr>
+            </a:p>
+          </p:txBody>
+        </p:sp>
+        <p:cxnSp>
+          <p:nvCxnSpPr>
+            <p:cNvPr id="12" name="Straight Arrow Connector 11"/>
+            <p:cNvCxnSpPr>
+              <a:stCxn id="11" idx="1"/>
+            </p:cNvCxnSpPr>
+            <p:nvPr/>
+          </p:nvCxnSpPr>
+          <p:spPr>
+            <a:xfrm flipH="1" flipV="1">
+              <a:off x="1159177" y="4469693"/>
+              <a:ext cx="239934" cy="713353"/>
+            </a:xfrm>
+            <a:prstGeom prst="straightConnector1">
+              <a:avLst/>
+            </a:prstGeom>
+            <a:ln w="19050">
+              <a:solidFill>
+                <a:schemeClr val="tx1"/>
+              </a:solidFill>
+              <a:tailEnd type="stealth" w="lg" len="lg"/>
+            </a:ln>
+          </p:spPr>
+          <p:style>
+            <a:lnRef idx="1">
+              <a:schemeClr val="accent1"/>
+            </a:lnRef>
+            <a:fillRef idx="0">
+              <a:schemeClr val="accent1"/>
+            </a:fillRef>
+            <a:effectRef idx="0">
+              <a:schemeClr val="accent1"/>
+            </a:effectRef>
+            <a:fontRef idx="minor">
+              <a:schemeClr val="tx1"/>
+            </a:fontRef>
+          </p:style>
+        </p:cxnSp>
+      </p:grpSp>
+    </p:spTree>
+    <p:extLst>
+      <p:ext uri="{BB962C8B-B14F-4D97-AF65-F5344CB8AC3E}">
+        <p14:creationId xmlns:p14="http://schemas.microsoft.com/office/powerpoint/2010/main" val="2872321676"/>
+      </p:ext>
+    </p:extLst>
+  </p:cSld>
+  <p:clrMapOvr>
+    <a:masterClrMapping/>
+  </p:clrMapOvr>
+  <p:timing>
+    <p:tnLst>
+      <p:par>
+        <p:cTn id="1" dur="indefinite" restart="never" nodeType="tmRoot">
+          <p:childTnLst>
+            <p:seq concurrent="1" nextAc="seek">
+              <p:cTn id="2" dur="indefinite" nodeType="mainSeq">
+                <p:childTnLst>
+                  <p:par>
+                    <p:cTn id="3" fill="hold">
+                      <p:stCondLst>
+                        <p:cond delay="indefinite"/>
+                      </p:stCondLst>
+                      <p:childTnLst>
+                        <p:par>
+                          <p:cTn id="4" fill="hold">
+                            <p:stCondLst>
+                              <p:cond delay="0"/>
+                            </p:stCondLst>
+                            <p:childTnLst>
+                              <p:par>
+                                <p:cTn id="5" presetID="1" presetClass="entr" presetSubtype="0" fill="hold" nodeType="clickEffect">
+                                  <p:stCondLst>
+                                    <p:cond delay="0"/>
+                                  </p:stCondLst>
+                                  <p:childTnLst>
+                                    <p:set>
+                                      <p:cBhvr>
+                                        <p:cTn id="6" dur="1" fill="hold">
+                                          <p:stCondLst>
+                                            <p:cond delay="0"/>
+                                          </p:stCondLst>
+                                        </p:cTn>
+                                        <p:tgtEl>
+                                          <p:spTgt spid="7"/>
+                                        </p:tgtEl>
+                                        <p:attrNameLst>
+                                          <p:attrName>style.visibility</p:attrName>
+                                        </p:attrNameLst>
+                                      </p:cBhvr>
+                                      <p:to>
+                                        <p:strVal val="visible"/>
+                                      </p:to>
+                                    </p:set>
+                                  </p:childTnLst>
+                                </p:cTn>
+                              </p:par>
+                            </p:childTnLst>
+                          </p:cTn>
+                        </p:par>
+                      </p:childTnLst>
+                    </p:cTn>
+                  </p:par>
+                  <p:par>
+                    <p:cTn id="7" fill="hold">
+                      <p:stCondLst>
+                        <p:cond delay="indefinite"/>
+                      </p:stCondLst>
+                      <p:childTnLst>
+                        <p:par>
+                          <p:cTn id="8" fill="hold">
+                            <p:stCondLst>
+                              <p:cond delay="0"/>
+                            </p:stCondLst>
+                            <p:childTnLst>
+                              <p:par>
+                                <p:cTn id="9" presetID="1" presetClass="entr" presetSubtype="0" fill="hold" nodeType="clickEffect">
+                                  <p:stCondLst>
+                                    <p:cond delay="0"/>
+                                  </p:stCondLst>
+                                  <p:childTnLst>
+                                    <p:set>
+                                      <p:cBhvr>
+                                        <p:cTn id="10" dur="1" fill="hold">
+                                          <p:stCondLst>
+                                            <p:cond delay="0"/>
+                                          </p:stCondLst>
+                                        </p:cTn>
+                                        <p:tgtEl>
+                                          <p:spTgt spid="10"/>
+                                        </p:tgtEl>
+                                        <p:attrNameLst>
+                                          <p:attrName>style.visibility</p:attrName>
+                                        </p:attrNameLst>
+                                      </p:cBhvr>
+                                      <p:to>
+                                        <p:strVal val="visible"/>
+                                      </p:to>
+                                    </p:set>
+                                  </p:childTnLst>
+                                </p:cTn>
+                              </p:par>
+                            </p:childTnLst>
+                          </p:cTn>
+                        </p:par>
+                      </p:childTnLst>
+                    </p:cTn>
+                  </p:par>
+                </p:childTnLst>
+              </p:cTn>
+              <p:prevCondLst>
+                <p:cond evt="onPrev" delay="0">
+                  <p:tgtEl>
+                    <p:sldTgt/>
+                  </p:tgtEl>
+                </p:cond>
+              </p:prevCondLst>
+              <p:nextCondLst>
+                <p:cond evt="onNext" delay="0">
+                  <p:tgtEl>
+                    <p:sldTgt/>
+                  </p:tgtEl>
+                </p:cond>
+              </p:nextCondLst>
+            </p:seq>
+          </p:childTnLst>
+        </p:cTn>
+      </p:par>
+    </p:tnLst>
+  </p:timing>
+</p:sld>
+</file>
+
 <file path=ppt/slides/slide2.xml><?xml version="1.0" encoding="utf-8"?>
 <p:sld xmlns:a="http://schemas.openxmlformats.org/drawingml/2006/main" xmlns:r="http://schemas.openxmlformats.org/officeDocument/2006/relationships" xmlns:p="http://schemas.openxmlformats.org/presentationml/2006/main">
   <p:cSld>
@@ -3941,14 +4950,7 @@
                   <a:latin typeface="Courier New" pitchFamily="49" charset="0"/>
                   <a:cs typeface="Courier New" pitchFamily="49" charset="0"/>
                 </a:rPr>
-                <a:t>class </a:t>
-              </a:r>
-              <a:r>
-                <a:rPr lang="nn-NO" sz="1600" dirty="0" smtClean="0">
-                  <a:latin typeface="Courier New" pitchFamily="49" charset="0"/>
-                  <a:cs typeface="Courier New" pitchFamily="49" charset="0"/>
-                </a:rPr>
-                <a:t>StaticParticle </a:t>
+                <a:t>class StaticParticle </a:t>
               </a:r>
               <a:r>
                 <a:rPr lang="nn-NO" sz="1600" dirty="0">
@@ -4012,21 +5014,7 @@
                   <a:latin typeface="Courier New" pitchFamily="49" charset="0"/>
                   <a:cs typeface="Courier New" pitchFamily="49" charset="0"/>
                 </a:rPr>
-                <a:t>StaticParticle(double </a:t>
-              </a:r>
-              <a:r>
-                <a:rPr lang="nn-NO" sz="1600" dirty="0" smtClean="0">
-                  <a:latin typeface="Courier New" pitchFamily="49" charset="0"/>
-                  <a:cs typeface="Courier New" pitchFamily="49" charset="0"/>
-                </a:rPr>
-                <a:t>x, double y</a:t>
-              </a:r>
-              <a:r>
-                <a:rPr lang="nn-NO" sz="1600" dirty="0" smtClean="0">
-                  <a:latin typeface="Courier New" pitchFamily="49" charset="0"/>
-                  <a:cs typeface="Courier New" pitchFamily="49" charset="0"/>
-                </a:rPr>
-                <a:t>,</a:t>
+                <a:t>StaticParticle(double x, double y,</a:t>
               </a:r>
             </a:p>
             <a:p>
@@ -4042,21 +5030,7 @@
                   <a:latin typeface="Courier New" pitchFamily="49" charset="0"/>
                   <a:cs typeface="Courier New" pitchFamily="49" charset="0"/>
                 </a:rPr>
-                <a:t>                     </a:t>
-              </a:r>
-              <a:r>
-                <a:rPr lang="nn-NO" sz="1600" dirty="0" smtClean="0">
-                  <a:latin typeface="Courier New" pitchFamily="49" charset="0"/>
-                  <a:cs typeface="Courier New" pitchFamily="49" charset="0"/>
-                </a:rPr>
-                <a:t> </a:t>
-              </a:r>
-              <a:r>
-                <a:rPr lang="nn-NO" sz="1600" dirty="0" smtClean="0">
-                  <a:latin typeface="Courier New" pitchFamily="49" charset="0"/>
-                  <a:cs typeface="Courier New" pitchFamily="49" charset="0"/>
-                </a:rPr>
-                <a:t>double mass) </a:t>
+                <a:t>                      double mass) </a:t>
               </a:r>
               <a:r>
                 <a:rPr lang="nn-NO" sz="1600" dirty="0">
@@ -4079,14 +5053,7 @@
                   <a:latin typeface="Courier New" pitchFamily="49" charset="0"/>
                   <a:cs typeface="Courier New" pitchFamily="49" charset="0"/>
                 </a:rPr>
-                <a:t>{x}, _y {y}, </a:t>
-              </a:r>
-              <a:r>
-                <a:rPr lang="nn-NO" sz="1600" dirty="0" smtClean="0">
-                  <a:latin typeface="Courier New" pitchFamily="49" charset="0"/>
-                  <a:cs typeface="Courier New" pitchFamily="49" charset="0"/>
-                </a:rPr>
-                <a:t>_</a:t>
+                <a:t>{x}, _y {y}, _</a:t>
               </a:r>
               <a:r>
                 <a:rPr lang="nn-NO" sz="1600" dirty="0">
@@ -4534,21 +5501,7 @@
                   <a:latin typeface="Courier New" pitchFamily="49" charset="0"/>
                   <a:cs typeface="Courier New" pitchFamily="49" charset="0"/>
                 </a:rPr>
-                <a:t>(double </a:t>
-              </a:r>
-              <a:r>
-                <a:rPr lang="nn-NO" sz="1600" dirty="0" smtClean="0">
-                  <a:latin typeface="Courier New" pitchFamily="49" charset="0"/>
-                  <a:cs typeface="Courier New" pitchFamily="49" charset="0"/>
-                </a:rPr>
-                <a:t>x, double y</a:t>
-              </a:r>
-              <a:r>
-                <a:rPr lang="nn-NO" sz="1600" dirty="0" smtClean="0">
-                  <a:latin typeface="Courier New" pitchFamily="49" charset="0"/>
-                  <a:cs typeface="Courier New" pitchFamily="49" charset="0"/>
-                </a:rPr>
-                <a:t>,</a:t>
+                <a:t>(double x, double y,</a:t>
               </a:r>
             </a:p>
             <a:p>
@@ -4594,21 +5547,7 @@
                   <a:latin typeface="Courier New" pitchFamily="49" charset="0"/>
                   <a:cs typeface="Courier New" pitchFamily="49" charset="0"/>
                 </a:rPr>
-                <a:t>      </a:t>
-              </a:r>
-              <a:r>
-                <a:rPr lang="nn-NO" sz="1600" dirty="0" smtClean="0">
-                  <a:latin typeface="Courier New" pitchFamily="49" charset="0"/>
-                  <a:cs typeface="Courier New" pitchFamily="49" charset="0"/>
-                </a:rPr>
-                <a:t>           double </a:t>
-              </a:r>
-              <a:r>
-                <a:rPr lang="nn-NO" sz="1600" dirty="0" smtClean="0">
-                  <a:latin typeface="Courier New" pitchFamily="49" charset="0"/>
-                  <a:cs typeface="Courier New" pitchFamily="49" charset="0"/>
-                </a:rPr>
-                <a:t>mass) </a:t>
+                <a:t>                 double mass) </a:t>
               </a:r>
               <a:r>
                 <a:rPr lang="nn-NO" sz="1600" dirty="0">
@@ -4657,14 +5596,7 @@
                   <a:latin typeface="Courier New" pitchFamily="49" charset="0"/>
                   <a:cs typeface="Courier New" pitchFamily="49" charset="0"/>
                 </a:rPr>
-                <a:t>           </a:t>
-              </a:r>
-              <a:r>
-                <a:rPr lang="nn-NO" sz="1600" dirty="0" smtClean="0">
-                  <a:latin typeface="Courier New" pitchFamily="49" charset="0"/>
-                  <a:cs typeface="Courier New" pitchFamily="49" charset="0"/>
-                </a:rPr>
-                <a:t>_mass </a:t>
+                <a:t>           _mass </a:t>
               </a:r>
               <a:r>
                 <a:rPr lang="nn-NO" sz="1600" dirty="0">
@@ -4738,14 +5670,7 @@
                   <a:latin typeface="Courier New" pitchFamily="49" charset="0"/>
                   <a:cs typeface="Courier New" pitchFamily="49" charset="0"/>
                 </a:rPr>
-                <a:t>_y; </a:t>
-              </a:r>
-              <a:r>
-                <a:rPr lang="nn-NO" sz="1600" dirty="0" smtClean="0">
-                  <a:latin typeface="Courier New" pitchFamily="49" charset="0"/>
-                  <a:cs typeface="Courier New" pitchFamily="49" charset="0"/>
-                </a:rPr>
-                <a:t>};</a:t>
+                <a:t>_y; };</a:t>
               </a:r>
             </a:p>
             <a:p>
@@ -5708,14 +6633,7 @@
                   <a:latin typeface="Courier New" pitchFamily="49" charset="0"/>
                   <a:cs typeface="Courier New" pitchFamily="49" charset="0"/>
                 </a:rPr>
-                <a:t>class </a:t>
-              </a:r>
-              <a:r>
-                <a:rPr lang="nn-NO" sz="1600" dirty="0" smtClean="0">
-                  <a:latin typeface="Courier New" pitchFamily="49" charset="0"/>
-                  <a:cs typeface="Courier New" pitchFamily="49" charset="0"/>
-                </a:rPr>
-                <a:t>Particle : public StaticParticle {</a:t>
+                <a:t>class Particle : public StaticParticle {</a:t>
               </a:r>
               <a:endParaRPr lang="nn-NO" sz="1600" dirty="0">
                 <a:latin typeface="Courier New" pitchFamily="49" charset="0"/>
@@ -5773,21 +6691,7 @@
                   <a:latin typeface="Courier New" pitchFamily="49" charset="0"/>
                   <a:cs typeface="Courier New" pitchFamily="49" charset="0"/>
                 </a:rPr>
-                <a:t>Particle(double </a:t>
-              </a:r>
-              <a:r>
-                <a:rPr lang="nn-NO" sz="1600" dirty="0" smtClean="0">
-                  <a:latin typeface="Courier New" pitchFamily="49" charset="0"/>
-                  <a:cs typeface="Courier New" pitchFamily="49" charset="0"/>
-                </a:rPr>
-                <a:t>x, double y</a:t>
-              </a:r>
-              <a:r>
-                <a:rPr lang="nn-NO" sz="1600" dirty="0" smtClean="0">
-                  <a:latin typeface="Courier New" pitchFamily="49" charset="0"/>
-                  <a:cs typeface="Courier New" pitchFamily="49" charset="0"/>
-                </a:rPr>
-                <a:t>,</a:t>
+                <a:t>Particle(double x, double y,</a:t>
               </a:r>
             </a:p>
             <a:p>
@@ -5816,28 +6720,7 @@
                   <a:latin typeface="Courier New" pitchFamily="49" charset="0"/>
                   <a:cs typeface="Courier New" pitchFamily="49" charset="0"/>
                 </a:rPr>
-                <a:t>      </a:t>
-              </a:r>
-              <a:r>
-                <a:rPr lang="nn-NO" sz="1600" dirty="0" smtClean="0">
-                  <a:latin typeface="Courier New" pitchFamily="49" charset="0"/>
-                  <a:cs typeface="Courier New" pitchFamily="49" charset="0"/>
-                </a:rPr>
-                <a:t>           double </a:t>
-              </a:r>
-              <a:r>
-                <a:rPr lang="nn-NO" sz="1600" dirty="0" smtClean="0">
-                  <a:latin typeface="Courier New" pitchFamily="49" charset="0"/>
-                  <a:cs typeface="Courier New" pitchFamily="49" charset="0"/>
-                </a:rPr>
-                <a:t>mass) </a:t>
-              </a:r>
-              <a:r>
-                <a:rPr lang="nn-NO" sz="1600" dirty="0" smtClean="0">
-                  <a:latin typeface="Courier New" pitchFamily="49" charset="0"/>
-                  <a:cs typeface="Courier New" pitchFamily="49" charset="0"/>
-                </a:rPr>
-                <a:t>:</a:t>
+                <a:t>                 double mass) :</a:t>
               </a:r>
             </a:p>
             <a:p>
@@ -5853,14 +6736,7 @@
                   <a:latin typeface="Courier New" pitchFamily="49" charset="0"/>
                   <a:cs typeface="Courier New" pitchFamily="49" charset="0"/>
                 </a:rPr>
-                <a:t>           </a:t>
-              </a:r>
-              <a:r>
-                <a:rPr lang="nn-NO" sz="1600" dirty="0" smtClean="0">
-                  <a:latin typeface="Courier New" pitchFamily="49" charset="0"/>
-                  <a:cs typeface="Courier New" pitchFamily="49" charset="0"/>
-                </a:rPr>
-                <a:t>StaticParticle(x, y, mass),</a:t>
+                <a:t>           StaticParticle(x, y, mass),</a:t>
               </a:r>
               <a:endParaRPr lang="nn-NO" sz="1600" dirty="0">
                 <a:latin typeface="Courier New" pitchFamily="49" charset="0"/>
@@ -7079,14 +7955,7 @@
                   <a:latin typeface="Courier New" pitchFamily="49" charset="0"/>
                   <a:cs typeface="Courier New" pitchFamily="49" charset="0"/>
                 </a:rPr>
-                <a:t>class </a:t>
-              </a:r>
-              <a:r>
-                <a:rPr lang="nn-NO" sz="1600" dirty="0" smtClean="0">
-                  <a:latin typeface="Courier New" pitchFamily="49" charset="0"/>
-                  <a:cs typeface="Courier New" pitchFamily="49" charset="0"/>
-                </a:rPr>
-                <a:t>StaticParticle </a:t>
+                <a:t>class StaticParticle </a:t>
               </a:r>
               <a:r>
                 <a:rPr lang="nn-NO" sz="1600" dirty="0">
@@ -8100,6 +8969,795 @@
       <p:bldP spid="3" grpId="0" uiExpand="1" build="p"/>
       <p:bldP spid="5" grpId="0" animBg="1"/>
     </p:bldLst>
+  </p:timing>
+</p:sld>
+</file>
+
+<file path=ppt/slides/slide9.xml><?xml version="1.0" encoding="utf-8"?>
+<p:sld xmlns:a="http://schemas.openxmlformats.org/drawingml/2006/main" xmlns:r="http://schemas.openxmlformats.org/officeDocument/2006/relationships" xmlns:p="http://schemas.openxmlformats.org/presentationml/2006/main">
+  <p:cSld>
+    <p:spTree>
+      <p:nvGrpSpPr>
+        <p:cNvPr id="1" name=""/>
+        <p:cNvGrpSpPr/>
+        <p:nvPr/>
+      </p:nvGrpSpPr>
+      <p:grpSpPr>
+        <a:xfrm>
+          <a:off x="0" y="0"/>
+          <a:ext cx="0" cy="0"/>
+          <a:chOff x="0" y="0"/>
+          <a:chExt cx="0" cy="0"/>
+        </a:xfrm>
+      </p:grpSpPr>
+      <p:sp>
+        <p:nvSpPr>
+          <p:cNvPr id="2" name="Title 1"/>
+          <p:cNvSpPr>
+            <a:spLocks noGrp="1"/>
+          </p:cNvSpPr>
+          <p:nvPr>
+            <p:ph type="title"/>
+          </p:nvPr>
+        </p:nvSpPr>
+        <p:spPr/>
+        <p:txBody>
+          <a:bodyPr/>
+          <a:lstStyle/>
+          <a:p>
+            <a:r>
+              <a:rPr lang="en-US" dirty="0" smtClean="0"/>
+              <a:t>Using child classes</a:t>
+            </a:r>
+            <a:endParaRPr lang="en-US" dirty="0"/>
+          </a:p>
+        </p:txBody>
+      </p:sp>
+      <p:sp>
+        <p:nvSpPr>
+          <p:cNvPr id="4" name="Slide Number Placeholder 3"/>
+          <p:cNvSpPr>
+            <a:spLocks noGrp="1"/>
+          </p:cNvSpPr>
+          <p:nvPr>
+            <p:ph type="sldNum" sz="quarter" idx="12"/>
+          </p:nvPr>
+        </p:nvSpPr>
+        <p:spPr/>
+        <p:txBody>
+          <a:bodyPr/>
+          <a:lstStyle/>
+          <a:p>
+            <a:fld id="{9CEF4966-5219-4577-B301-14467D565841}" type="slidenum">
+              <a:rPr lang="en-US" smtClean="0"/>
+              <a:t>9</a:t>
+            </a:fld>
+            <a:endParaRPr lang="en-US"/>
+          </a:p>
+        </p:txBody>
+      </p:sp>
+      <p:grpSp>
+        <p:nvGrpSpPr>
+          <p:cNvPr id="5" name="Group 4"/>
+          <p:cNvGrpSpPr/>
+          <p:nvPr/>
+        </p:nvGrpSpPr>
+        <p:grpSpPr>
+          <a:xfrm>
+            <a:off x="628650" y="1458497"/>
+            <a:ext cx="6033394" cy="5016758"/>
+            <a:chOff x="628650" y="1690689"/>
+            <a:chExt cx="6033394" cy="5016758"/>
+          </a:xfrm>
+        </p:grpSpPr>
+        <p:sp>
+          <p:nvSpPr>
+            <p:cNvPr id="6" name="TextBox 5"/>
+            <p:cNvSpPr txBox="1"/>
+            <p:nvPr/>
+          </p:nvSpPr>
+          <p:spPr>
+            <a:xfrm>
+              <a:off x="628650" y="1690689"/>
+              <a:ext cx="6033394" cy="5016758"/>
+            </a:xfrm>
+            <a:prstGeom prst="rect">
+              <a:avLst/>
+            </a:prstGeom>
+            <a:solidFill>
+              <a:schemeClr val="bg1">
+                <a:lumMod val="75000"/>
+              </a:schemeClr>
+            </a:solidFill>
+          </p:spPr>
+          <p:txBody>
+            <a:bodyPr wrap="square" rtlCol="0">
+              <a:spAutoFit/>
+            </a:bodyPr>
+            <a:lstStyle/>
+            <a:p>
+              <a:r>
+                <a:rPr lang="nn-NO" sz="1600" dirty="0">
+                  <a:latin typeface="Courier New" pitchFamily="49" charset="0"/>
+                  <a:cs typeface="Courier New" pitchFamily="49" charset="0"/>
+                </a:rPr>
+                <a:t>#include &lt;iostream&gt;</a:t>
+              </a:r>
+            </a:p>
+            <a:p>
+              <a:r>
+                <a:rPr lang="nn-NO" sz="1600" dirty="0">
+                  <a:latin typeface="Courier New" pitchFamily="49" charset="0"/>
+                  <a:cs typeface="Courier New" pitchFamily="49" charset="0"/>
+                </a:rPr>
+                <a:t>#include "particle.h"</a:t>
+              </a:r>
+            </a:p>
+            <a:p>
+              <a:endParaRPr lang="nn-NO" sz="1600" dirty="0">
+                <a:latin typeface="Courier New" pitchFamily="49" charset="0"/>
+                <a:cs typeface="Courier New" pitchFamily="49" charset="0"/>
+              </a:endParaRPr>
+            </a:p>
+            <a:p>
+              <a:r>
+                <a:rPr lang="nn-NO" sz="1600" dirty="0">
+                  <a:latin typeface="Courier New" pitchFamily="49" charset="0"/>
+                  <a:cs typeface="Courier New" pitchFamily="49" charset="0"/>
+                </a:rPr>
+                <a:t>using namespace std;</a:t>
+              </a:r>
+            </a:p>
+            <a:p>
+              <a:endParaRPr lang="nn-NO" sz="1600" dirty="0">
+                <a:latin typeface="Courier New" pitchFamily="49" charset="0"/>
+                <a:cs typeface="Courier New" pitchFamily="49" charset="0"/>
+              </a:endParaRPr>
+            </a:p>
+            <a:p>
+              <a:r>
+                <a:rPr lang="nn-NO" sz="1600" dirty="0">
+                  <a:latin typeface="Courier New" pitchFamily="49" charset="0"/>
+                  <a:cs typeface="Courier New" pitchFamily="49" charset="0"/>
+                </a:rPr>
+                <a:t>int main(void) {</a:t>
+              </a:r>
+            </a:p>
+            <a:p>
+              <a:r>
+                <a:rPr lang="nn-NO" sz="1600" dirty="0">
+                  <a:latin typeface="Courier New" pitchFamily="49" charset="0"/>
+                  <a:cs typeface="Courier New" pitchFamily="49" charset="0"/>
+                </a:rPr>
+                <a:t>    StaticParticle p_s(0.0, 0.0, 1.0);</a:t>
+              </a:r>
+            </a:p>
+            <a:p>
+              <a:r>
+                <a:rPr lang="nn-NO" sz="1600" dirty="0">
+                  <a:latin typeface="Courier New" pitchFamily="49" charset="0"/>
+                  <a:cs typeface="Courier New" pitchFamily="49" charset="0"/>
+                </a:rPr>
+                <a:t>    cout &lt;&lt; </a:t>
+              </a:r>
+              <a:r>
+                <a:rPr lang="nn-NO" sz="1600" dirty="0" smtClean="0">
+                  <a:latin typeface="Courier New" pitchFamily="49" charset="0"/>
+                  <a:cs typeface="Courier New" pitchFamily="49" charset="0"/>
+                </a:rPr>
+                <a:t>p_s </a:t>
+              </a:r>
+              <a:r>
+                <a:rPr lang="nn-NO" sz="1600" dirty="0">
+                  <a:latin typeface="Courier New" pitchFamily="49" charset="0"/>
+                  <a:cs typeface="Courier New" pitchFamily="49" charset="0"/>
+                </a:rPr>
+                <a:t>&lt;&lt; endl;</a:t>
+              </a:r>
+            </a:p>
+            <a:p>
+              <a:r>
+                <a:rPr lang="nn-NO" sz="1600" dirty="0">
+                  <a:latin typeface="Courier New" pitchFamily="49" charset="0"/>
+                  <a:cs typeface="Courier New" pitchFamily="49" charset="0"/>
+                </a:rPr>
+                <a:t>    Particle p1(1.0, 0.0, 1.0, 0.5, 1.0);</a:t>
+              </a:r>
+            </a:p>
+            <a:p>
+              <a:r>
+                <a:rPr lang="nn-NO" sz="1600" dirty="0">
+                  <a:latin typeface="Courier New" pitchFamily="49" charset="0"/>
+                  <a:cs typeface="Courier New" pitchFamily="49" charset="0"/>
+                </a:rPr>
+                <a:t>    cout &lt;&lt; </a:t>
+              </a:r>
+              <a:r>
+                <a:rPr lang="nn-NO" sz="1600" dirty="0" smtClean="0">
+                  <a:latin typeface="Courier New" pitchFamily="49" charset="0"/>
+                  <a:cs typeface="Courier New" pitchFamily="49" charset="0"/>
+                </a:rPr>
+                <a:t>p1 </a:t>
+              </a:r>
+              <a:r>
+                <a:rPr lang="nn-NO" sz="1600" dirty="0">
+                  <a:latin typeface="Courier New" pitchFamily="49" charset="0"/>
+                  <a:cs typeface="Courier New" pitchFamily="49" charset="0"/>
+                </a:rPr>
+                <a:t>&lt;&lt; endl;</a:t>
+              </a:r>
+            </a:p>
+            <a:p>
+              <a:r>
+                <a:rPr lang="nn-NO" sz="1600" dirty="0">
+                  <a:latin typeface="Courier New" pitchFamily="49" charset="0"/>
+                  <a:cs typeface="Courier New" pitchFamily="49" charset="0"/>
+                </a:rPr>
+                <a:t>    Particle p2(0.0, 1.0, 0.0, 0.5, 2.0</a:t>
+              </a:r>
+              <a:r>
+                <a:rPr lang="nn-NO" sz="1600" dirty="0" smtClean="0">
+                  <a:latin typeface="Courier New" pitchFamily="49" charset="0"/>
+                  <a:cs typeface="Courier New" pitchFamily="49" charset="0"/>
+                </a:rPr>
+                <a:t>);</a:t>
+              </a:r>
+              <a:endParaRPr lang="nn-NO" sz="1600" dirty="0">
+                <a:latin typeface="Courier New" pitchFamily="49" charset="0"/>
+                <a:cs typeface="Courier New" pitchFamily="49" charset="0"/>
+              </a:endParaRPr>
+            </a:p>
+            <a:p>
+              <a:r>
+                <a:rPr lang="nn-NO" sz="1600" dirty="0">
+                  <a:latin typeface="Courier New" pitchFamily="49" charset="0"/>
+                  <a:cs typeface="Courier New" pitchFamily="49" charset="0"/>
+                </a:rPr>
+                <a:t>    cout &lt;&lt; </a:t>
+              </a:r>
+              <a:r>
+                <a:rPr lang="nn-NO" sz="1600" dirty="0" smtClean="0">
+                  <a:latin typeface="Courier New" pitchFamily="49" charset="0"/>
+                  <a:cs typeface="Courier New" pitchFamily="49" charset="0"/>
+                </a:rPr>
+                <a:t>p2 </a:t>
+              </a:r>
+              <a:r>
+                <a:rPr lang="nn-NO" sz="1600" dirty="0">
+                  <a:latin typeface="Courier New" pitchFamily="49" charset="0"/>
+                  <a:cs typeface="Courier New" pitchFamily="49" charset="0"/>
+                </a:rPr>
+                <a:t>&lt;&lt; endl;</a:t>
+              </a:r>
+            </a:p>
+            <a:p>
+              <a:r>
+                <a:rPr lang="nn-NO" sz="1600" dirty="0">
+                  <a:latin typeface="Courier New" pitchFamily="49" charset="0"/>
+                  <a:cs typeface="Courier New" pitchFamily="49" charset="0"/>
+                </a:rPr>
+                <a:t>    cout &lt;&lt; p1 &lt;&lt; endl;</a:t>
+              </a:r>
+            </a:p>
+            <a:p>
+              <a:r>
+                <a:rPr lang="nn-NO" sz="1600" dirty="0">
+                  <a:latin typeface="Courier New" pitchFamily="49" charset="0"/>
+                  <a:cs typeface="Courier New" pitchFamily="49" charset="0"/>
+                </a:rPr>
+                <a:t>    const double delta_t = 0.1;</a:t>
+              </a:r>
+            </a:p>
+            <a:p>
+              <a:r>
+                <a:rPr lang="nn-NO" sz="1600" dirty="0">
+                  <a:latin typeface="Courier New" pitchFamily="49" charset="0"/>
+                  <a:cs typeface="Courier New" pitchFamily="49" charset="0"/>
+                </a:rPr>
+                <a:t>    p1.move(delta_t);</a:t>
+              </a:r>
+            </a:p>
+            <a:p>
+              <a:r>
+                <a:rPr lang="nn-NO" sz="1600" dirty="0">
+                  <a:latin typeface="Courier New" pitchFamily="49" charset="0"/>
+                  <a:cs typeface="Courier New" pitchFamily="49" charset="0"/>
+                </a:rPr>
+                <a:t>    cout &lt;&lt; </a:t>
+              </a:r>
+              <a:r>
+                <a:rPr lang="nn-NO" sz="1600" dirty="0" smtClean="0">
+                  <a:latin typeface="Courier New" pitchFamily="49" charset="0"/>
+                  <a:cs typeface="Courier New" pitchFamily="49" charset="0"/>
+                </a:rPr>
+                <a:t>p1 </a:t>
+              </a:r>
+              <a:r>
+                <a:rPr lang="nn-NO" sz="1600" dirty="0">
+                  <a:latin typeface="Courier New" pitchFamily="49" charset="0"/>
+                  <a:cs typeface="Courier New" pitchFamily="49" charset="0"/>
+                </a:rPr>
+                <a:t>&lt;&lt;  endl;</a:t>
+              </a:r>
+            </a:p>
+            <a:p>
+              <a:r>
+                <a:rPr lang="nn-NO" sz="1600" dirty="0">
+                  <a:latin typeface="Courier New" pitchFamily="49" charset="0"/>
+                  <a:cs typeface="Courier New" pitchFamily="49" charset="0"/>
+                </a:rPr>
+                <a:t>    cout &lt;&lt; </a:t>
+              </a:r>
+              <a:r>
+                <a:rPr lang="nn-NO" sz="1600" dirty="0" smtClean="0">
+                  <a:latin typeface="Courier New" pitchFamily="49" charset="0"/>
+                  <a:cs typeface="Courier New" pitchFamily="49" charset="0"/>
+                </a:rPr>
+                <a:t>p1.dist(p_s</a:t>
+              </a:r>
+              <a:r>
+                <a:rPr lang="nn-NO" sz="1600" dirty="0">
+                  <a:latin typeface="Courier New" pitchFamily="49" charset="0"/>
+                  <a:cs typeface="Courier New" pitchFamily="49" charset="0"/>
+                </a:rPr>
+                <a:t>) &lt;&lt; endl</a:t>
+              </a:r>
+              <a:r>
+                <a:rPr lang="nn-NO" sz="1600" dirty="0" smtClean="0">
+                  <a:latin typeface="Courier New" pitchFamily="49" charset="0"/>
+                  <a:cs typeface="Courier New" pitchFamily="49" charset="0"/>
+                </a:rPr>
+                <a:t>;</a:t>
+              </a:r>
+            </a:p>
+            <a:p>
+              <a:r>
+                <a:rPr lang="nn-NO" sz="1600" dirty="0">
+                  <a:latin typeface="Courier New" pitchFamily="49" charset="0"/>
+                  <a:cs typeface="Courier New" pitchFamily="49" charset="0"/>
+                </a:rPr>
+                <a:t> </a:t>
+              </a:r>
+              <a:r>
+                <a:rPr lang="nn-NO" sz="1600" dirty="0" smtClean="0">
+                  <a:latin typeface="Courier New" pitchFamily="49" charset="0"/>
+                  <a:cs typeface="Courier New" pitchFamily="49" charset="0"/>
+                </a:rPr>
+                <a:t>   cout &lt;&lt; p1.dist(p2) &lt;&lt; endl;</a:t>
+              </a:r>
+              <a:endParaRPr lang="nn-NO" sz="1600" dirty="0">
+                <a:latin typeface="Courier New" pitchFamily="49" charset="0"/>
+                <a:cs typeface="Courier New" pitchFamily="49" charset="0"/>
+              </a:endParaRPr>
+            </a:p>
+            <a:p>
+              <a:r>
+                <a:rPr lang="nn-NO" sz="1600" dirty="0" smtClean="0">
+                  <a:latin typeface="Courier New" pitchFamily="49" charset="0"/>
+                  <a:cs typeface="Courier New" pitchFamily="49" charset="0"/>
+                </a:rPr>
+                <a:t>    return </a:t>
+              </a:r>
+              <a:r>
+                <a:rPr lang="nn-NO" sz="1600" dirty="0">
+                  <a:latin typeface="Courier New" pitchFamily="49" charset="0"/>
+                  <a:cs typeface="Courier New" pitchFamily="49" charset="0"/>
+                </a:rPr>
+                <a:t>0;</a:t>
+              </a:r>
+            </a:p>
+            <a:p>
+              <a:r>
+                <a:rPr lang="nn-NO" sz="1600" dirty="0">
+                  <a:latin typeface="Courier New" pitchFamily="49" charset="0"/>
+                  <a:cs typeface="Courier New" pitchFamily="49" charset="0"/>
+                </a:rPr>
+                <a:t>}</a:t>
+              </a:r>
+            </a:p>
+          </p:txBody>
+        </p:sp>
+        <p:sp>
+          <p:nvSpPr>
+            <p:cNvPr id="7" name="TextBox 6"/>
+            <p:cNvSpPr txBox="1"/>
+            <p:nvPr/>
+          </p:nvSpPr>
+          <p:spPr>
+            <a:xfrm>
+              <a:off x="5733585" y="1690689"/>
+              <a:ext cx="928459" cy="276999"/>
+            </a:xfrm>
+            <a:prstGeom prst="rect">
+              <a:avLst/>
+            </a:prstGeom>
+            <a:solidFill>
+              <a:schemeClr val="bg1"/>
+            </a:solidFill>
+            <a:ln>
+              <a:solidFill>
+                <a:schemeClr val="tx1"/>
+              </a:solidFill>
+            </a:ln>
+          </p:spPr>
+          <p:txBody>
+            <a:bodyPr wrap="none" rtlCol="0">
+              <a:spAutoFit/>
+            </a:bodyPr>
+            <a:lstStyle/>
+            <a:p>
+              <a:r>
+                <a:rPr lang="en-US" sz="1200" dirty="0" smtClean="0">
+                  <a:latin typeface="Courier New" panose="02070309020205020404" pitchFamily="49" charset="0"/>
+                  <a:cs typeface="Courier New" panose="02070309020205020404" pitchFamily="49" charset="0"/>
+                </a:rPr>
+                <a:t>main.cpp</a:t>
+              </a:r>
+              <a:endParaRPr lang="en-US" sz="1200" dirty="0">
+                <a:latin typeface="Courier New" panose="02070309020205020404" pitchFamily="49" charset="0"/>
+                <a:cs typeface="Courier New" panose="02070309020205020404" pitchFamily="49" charset="0"/>
+              </a:endParaRPr>
+            </a:p>
+          </p:txBody>
+        </p:sp>
+      </p:grpSp>
+      <p:grpSp>
+        <p:nvGrpSpPr>
+          <p:cNvPr id="8" name="Group 7"/>
+          <p:cNvGrpSpPr/>
+          <p:nvPr/>
+        </p:nvGrpSpPr>
+        <p:grpSpPr>
+          <a:xfrm>
+            <a:off x="5219361" y="4923923"/>
+            <a:ext cx="3528128" cy="1015663"/>
+            <a:chOff x="1563257" y="2838808"/>
+            <a:chExt cx="3528128" cy="1015663"/>
+          </a:xfrm>
+        </p:grpSpPr>
+        <p:sp>
+          <p:nvSpPr>
+            <p:cNvPr id="9" name="TextBox 8"/>
+            <p:cNvSpPr txBox="1"/>
+            <p:nvPr/>
+          </p:nvSpPr>
+          <p:spPr>
+            <a:xfrm>
+              <a:off x="2658149" y="2838808"/>
+              <a:ext cx="2433236" cy="1015663"/>
+            </a:xfrm>
+            <a:prstGeom prst="rect">
+              <a:avLst/>
+            </a:prstGeom>
+            <a:solidFill>
+              <a:schemeClr val="bg1"/>
+            </a:solidFill>
+            <a:ln w="19050">
+              <a:solidFill>
+                <a:schemeClr val="tx1"/>
+              </a:solidFill>
+            </a:ln>
+          </p:spPr>
+          <p:txBody>
+            <a:bodyPr wrap="square" rtlCol="0">
+              <a:spAutoFit/>
+            </a:bodyPr>
+            <a:lstStyle/>
+            <a:p>
+              <a:r>
+                <a:rPr lang="en-US" sz="2000" dirty="0" smtClean="0"/>
+                <a:t>calling inherited</a:t>
+              </a:r>
+              <a:br>
+                <a:rPr lang="en-US" sz="2000" dirty="0" smtClean="0"/>
+              </a:br>
+              <a:r>
+                <a:rPr lang="en-US" sz="2000" dirty="0" smtClean="0"/>
+                <a:t>method from</a:t>
+              </a:r>
+              <a:br>
+                <a:rPr lang="en-US" sz="2000" dirty="0" smtClean="0"/>
+              </a:br>
+              <a:r>
+                <a:rPr lang="en-US" sz="2000" dirty="0" err="1" smtClean="0">
+                  <a:latin typeface="Courier New" panose="02070309020205020404" pitchFamily="49" charset="0"/>
+                  <a:cs typeface="Courier New" panose="02070309020205020404" pitchFamily="49" charset="0"/>
+                </a:rPr>
+                <a:t>StaticParticle</a:t>
+              </a:r>
+              <a:endParaRPr lang="en-US" sz="2000" dirty="0">
+                <a:latin typeface="Courier New" panose="02070309020205020404" pitchFamily="49" charset="0"/>
+                <a:cs typeface="Courier New" panose="02070309020205020404" pitchFamily="49" charset="0"/>
+              </a:endParaRPr>
+            </a:p>
+          </p:txBody>
+        </p:sp>
+        <p:cxnSp>
+          <p:nvCxnSpPr>
+            <p:cNvPr id="10" name="Straight Arrow Connector 9"/>
+            <p:cNvCxnSpPr>
+              <a:stCxn id="9" idx="1"/>
+            </p:cNvCxnSpPr>
+            <p:nvPr/>
+          </p:nvCxnSpPr>
+          <p:spPr>
+            <a:xfrm flipH="1">
+              <a:off x="1563257" y="3346640"/>
+              <a:ext cx="1094892" cy="200054"/>
+            </a:xfrm>
+            <a:prstGeom prst="straightConnector1">
+              <a:avLst/>
+            </a:prstGeom>
+            <a:ln w="19050">
+              <a:solidFill>
+                <a:schemeClr val="tx1"/>
+              </a:solidFill>
+              <a:tailEnd type="stealth" w="lg" len="lg"/>
+            </a:ln>
+          </p:spPr>
+          <p:style>
+            <a:lnRef idx="1">
+              <a:schemeClr val="accent1"/>
+            </a:lnRef>
+            <a:fillRef idx="0">
+              <a:schemeClr val="accent1"/>
+            </a:fillRef>
+            <a:effectRef idx="0">
+              <a:schemeClr val="accent1"/>
+            </a:effectRef>
+            <a:fontRef idx="minor">
+              <a:schemeClr val="tx1"/>
+            </a:fontRef>
+          </p:style>
+        </p:cxnSp>
+      </p:grpSp>
+      <p:grpSp>
+        <p:nvGrpSpPr>
+          <p:cNvPr id="12" name="Group 11"/>
+          <p:cNvGrpSpPr/>
+          <p:nvPr/>
+        </p:nvGrpSpPr>
+        <p:grpSpPr>
+          <a:xfrm>
+            <a:off x="3932730" y="4007572"/>
+            <a:ext cx="4814759" cy="1035090"/>
+            <a:chOff x="276626" y="2823085"/>
+            <a:chExt cx="4814759" cy="1035090"/>
+          </a:xfrm>
+        </p:grpSpPr>
+        <p:sp>
+          <p:nvSpPr>
+            <p:cNvPr id="13" name="TextBox 12"/>
+            <p:cNvSpPr txBox="1"/>
+            <p:nvPr/>
+          </p:nvSpPr>
+          <p:spPr>
+            <a:xfrm>
+              <a:off x="2285916" y="2823085"/>
+              <a:ext cx="2805469" cy="707886"/>
+            </a:xfrm>
+            <a:prstGeom prst="rect">
+              <a:avLst/>
+            </a:prstGeom>
+            <a:solidFill>
+              <a:schemeClr val="bg1"/>
+            </a:solidFill>
+            <a:ln w="19050">
+              <a:solidFill>
+                <a:schemeClr val="tx1"/>
+              </a:solidFill>
+            </a:ln>
+          </p:spPr>
+          <p:txBody>
+            <a:bodyPr wrap="square" rtlCol="0">
+              <a:spAutoFit/>
+            </a:bodyPr>
+            <a:lstStyle/>
+            <a:p>
+              <a:r>
+                <a:rPr lang="en-US" sz="2000" dirty="0" smtClean="0"/>
+                <a:t>only for </a:t>
+              </a:r>
+              <a:r>
+                <a:rPr lang="en-US" sz="2000" dirty="0" smtClean="0">
+                  <a:latin typeface="Courier New" panose="02070309020205020404" pitchFamily="49" charset="0"/>
+                  <a:cs typeface="Courier New" panose="02070309020205020404" pitchFamily="49" charset="0"/>
+                </a:rPr>
+                <a:t>Particle</a:t>
+              </a:r>
+              <a:r>
+                <a:rPr lang="en-US" sz="2000" dirty="0" smtClean="0"/>
+                <a:t>,</a:t>
+              </a:r>
+              <a:br>
+                <a:rPr lang="en-US" sz="2000" dirty="0" smtClean="0"/>
+              </a:br>
+              <a:r>
+                <a:rPr lang="en-US" sz="2000" dirty="0" smtClean="0"/>
+                <a:t>not </a:t>
+              </a:r>
+              <a:r>
+                <a:rPr lang="en-US" sz="2000" dirty="0" err="1" smtClean="0">
+                  <a:latin typeface="Courier New" panose="02070309020205020404" pitchFamily="49" charset="0"/>
+                  <a:cs typeface="Courier New" panose="02070309020205020404" pitchFamily="49" charset="0"/>
+                </a:rPr>
+                <a:t>StaticParticle</a:t>
+              </a:r>
+              <a:endParaRPr lang="en-US" sz="2000" dirty="0">
+                <a:latin typeface="Courier New" panose="02070309020205020404" pitchFamily="49" charset="0"/>
+                <a:cs typeface="Courier New" panose="02070309020205020404" pitchFamily="49" charset="0"/>
+              </a:endParaRPr>
+            </a:p>
+          </p:txBody>
+        </p:sp>
+        <p:cxnSp>
+          <p:nvCxnSpPr>
+            <p:cNvPr id="14" name="Straight Arrow Connector 13"/>
+            <p:cNvCxnSpPr>
+              <a:stCxn id="13" idx="1"/>
+            </p:cNvCxnSpPr>
+            <p:nvPr/>
+          </p:nvCxnSpPr>
+          <p:spPr>
+            <a:xfrm flipH="1">
+              <a:off x="276626" y="3177028"/>
+              <a:ext cx="2009290" cy="681147"/>
+            </a:xfrm>
+            <a:prstGeom prst="straightConnector1">
+              <a:avLst/>
+            </a:prstGeom>
+            <a:ln w="19050">
+              <a:solidFill>
+                <a:schemeClr val="tx1"/>
+              </a:solidFill>
+              <a:tailEnd type="stealth" w="lg" len="lg"/>
+            </a:ln>
+          </p:spPr>
+          <p:style>
+            <a:lnRef idx="1">
+              <a:schemeClr val="accent1"/>
+            </a:lnRef>
+            <a:fillRef idx="0">
+              <a:schemeClr val="accent1"/>
+            </a:fillRef>
+            <a:effectRef idx="0">
+              <a:schemeClr val="accent1"/>
+            </a:effectRef>
+            <a:fontRef idx="minor">
+              <a:schemeClr val="tx1"/>
+            </a:fontRef>
+          </p:style>
+        </p:cxnSp>
+      </p:grpSp>
+    </p:spTree>
+    <p:extLst>
+      <p:ext uri="{BB962C8B-B14F-4D97-AF65-F5344CB8AC3E}">
+        <p14:creationId xmlns:p14="http://schemas.microsoft.com/office/powerpoint/2010/main" val="3442705385"/>
+      </p:ext>
+    </p:extLst>
+  </p:cSld>
+  <p:clrMapOvr>
+    <a:masterClrMapping/>
+  </p:clrMapOvr>
+  <p:timing>
+    <p:tnLst>
+      <p:par>
+        <p:cTn id="1" dur="indefinite" restart="never" nodeType="tmRoot">
+          <p:childTnLst>
+            <p:seq concurrent="1" nextAc="seek">
+              <p:cTn id="2" dur="indefinite" nodeType="mainSeq">
+                <p:childTnLst>
+                  <p:par>
+                    <p:cTn id="3" fill="hold">
+                      <p:stCondLst>
+                        <p:cond delay="indefinite"/>
+                      </p:stCondLst>
+                      <p:childTnLst>
+                        <p:par>
+                          <p:cTn id="4" fill="hold">
+                            <p:stCondLst>
+                              <p:cond delay="0"/>
+                            </p:stCondLst>
+                            <p:childTnLst>
+                              <p:par>
+                                <p:cTn id="5" presetID="1" presetClass="entr" presetSubtype="0" fill="hold" nodeType="clickEffect">
+                                  <p:stCondLst>
+                                    <p:cond delay="0"/>
+                                  </p:stCondLst>
+                                  <p:childTnLst>
+                                    <p:set>
+                                      <p:cBhvr>
+                                        <p:cTn id="6" dur="1" fill="hold">
+                                          <p:stCondLst>
+                                            <p:cond delay="0"/>
+                                          </p:stCondLst>
+                                        </p:cTn>
+                                        <p:tgtEl>
+                                          <p:spTgt spid="12"/>
+                                        </p:tgtEl>
+                                        <p:attrNameLst>
+                                          <p:attrName>style.visibility</p:attrName>
+                                        </p:attrNameLst>
+                                      </p:cBhvr>
+                                      <p:to>
+                                        <p:strVal val="visible"/>
+                                      </p:to>
+                                    </p:set>
+                                  </p:childTnLst>
+                                </p:cTn>
+                              </p:par>
+                            </p:childTnLst>
+                          </p:cTn>
+                        </p:par>
+                      </p:childTnLst>
+                    </p:cTn>
+                  </p:par>
+                  <p:par>
+                    <p:cTn id="7" fill="hold">
+                      <p:stCondLst>
+                        <p:cond delay="indefinite"/>
+                      </p:stCondLst>
+                      <p:childTnLst>
+                        <p:par>
+                          <p:cTn id="8" fill="hold">
+                            <p:stCondLst>
+                              <p:cond delay="0"/>
+                            </p:stCondLst>
+                            <p:childTnLst>
+                              <p:par>
+                                <p:cTn id="9" presetID="1" presetClass="entr" presetSubtype="0" fill="hold" nodeType="clickEffect">
+                                  <p:stCondLst>
+                                    <p:cond delay="0"/>
+                                  </p:stCondLst>
+                                  <p:childTnLst>
+                                    <p:set>
+                                      <p:cBhvr>
+                                        <p:cTn id="10" dur="1" fill="hold">
+                                          <p:stCondLst>
+                                            <p:cond delay="0"/>
+                                          </p:stCondLst>
+                                        </p:cTn>
+                                        <p:tgtEl>
+                                          <p:spTgt spid="8"/>
+                                        </p:tgtEl>
+                                        <p:attrNameLst>
+                                          <p:attrName>style.visibility</p:attrName>
+                                        </p:attrNameLst>
+                                      </p:cBhvr>
+                                      <p:to>
+                                        <p:strVal val="visible"/>
+                                      </p:to>
+                                    </p:set>
+                                  </p:childTnLst>
+                                </p:cTn>
+                              </p:par>
+                            </p:childTnLst>
+                          </p:cTn>
+                        </p:par>
+                      </p:childTnLst>
+                    </p:cTn>
+                  </p:par>
+                </p:childTnLst>
+              </p:cTn>
+              <p:prevCondLst>
+                <p:cond evt="onPrev" delay="0">
+                  <p:tgtEl>
+                    <p:sldTgt/>
+                  </p:tgtEl>
+                </p:cond>
+              </p:prevCondLst>
+              <p:nextCondLst>
+                <p:cond evt="onNext" delay="0">
+                  <p:tgtEl>
+                    <p:sldTgt/>
+                  </p:tgtEl>
+                </p:cond>
+              </p:nextCondLst>
+            </p:seq>
+          </p:childTnLst>
+        </p:cTn>
+      </p:par>
+    </p:tnLst>
   </p:timing>
 </p:sld>
 </file>

</xml_diff>

<commit_message>
Added topic to left out slide
</commit_message>
<xml_diff>
--- a/CPlusPlus/04_essential_cpp_classes.pptx
+++ b/CPlusPlus/04_essential_cpp_classes.pptx
@@ -4742,7 +4742,21 @@
           <a:p>
             <a:r>
               <a:rPr lang="en-US" dirty="0" smtClean="0"/>
-              <a:t>Multiple inheritance</a:t>
+              <a:t>Multiple </a:t>
+            </a:r>
+            <a:r>
+              <a:rPr lang="en-US" dirty="0" smtClean="0"/>
+              <a:t>inheritance/class hierarchy</a:t>
+            </a:r>
+          </a:p>
+          <a:p>
+            <a:r>
+              <a:rPr lang="en-US" dirty="0" smtClean="0"/>
+              <a:t>Copy </a:t>
+            </a:r>
+            <a:r>
+              <a:rPr lang="en-US" smtClean="0"/>
+              <a:t>versus move</a:t>
             </a:r>
             <a:endParaRPr lang="en-US" dirty="0"/>
           </a:p>

</xml_diff>